<commit_message>
03-28.pptx 수정 - 11, 12페이지 추가
</commit_message>
<xml_diff>
--- a/ppt/03-28.pptx
+++ b/ppt/03-28.pptx
@@ -15,6 +15,8 @@
     <p:sldId id="264" r:id="rId9"/>
     <p:sldId id="265" r:id="rId10"/>
     <p:sldId id="266" r:id="rId11"/>
+    <p:sldId id="267" r:id="rId12"/>
+    <p:sldId id="268" r:id="rId13"/>
   </p:sldIdLst>
   <p:sldSz cx="12192000" cy="6858000"/>
   <p:notesSz cx="6858000" cy="9144000"/>
@@ -3318,6 +3320,677 @@
 </p:sld>
 </file>
 
+<file path=ppt/slides/slide11.xml><?xml version="1.0" encoding="utf-8"?>
+<p:sld xmlns:a="http://schemas.openxmlformats.org/drawingml/2006/main" xmlns:r="http://schemas.openxmlformats.org/officeDocument/2006/relationships" xmlns:p="http://schemas.openxmlformats.org/presentationml/2006/main">
+  <p:cSld>
+    <p:spTree>
+      <p:nvGrpSpPr>
+        <p:cNvPr id="1" name=""/>
+        <p:cNvGrpSpPr/>
+        <p:nvPr/>
+      </p:nvGrpSpPr>
+      <p:grpSpPr>
+        <a:xfrm>
+          <a:off x="0" y="0"/>
+          <a:ext cx="0" cy="0"/>
+          <a:chOff x="0" y="0"/>
+          <a:chExt cx="0" cy="0"/>
+        </a:xfrm>
+      </p:grpSpPr>
+      <p:sp>
+        <p:nvSpPr>
+          <p:cNvPr id="11" name="TextBox 10"/>
+          <p:cNvSpPr txBox="1"/>
+          <p:nvPr/>
+        </p:nvSpPr>
+        <p:spPr>
+          <a:xfrm>
+            <a:off x="607101" y="352269"/>
+            <a:ext cx="1821332" cy="454292"/>
+          </a:xfrm>
+          <a:prstGeom prst="rect">
+            <a:avLst/>
+          </a:prstGeom>
+          <a:noFill/>
+        </p:spPr>
+        <p:txBody>
+          <a:bodyPr wrap="none" rtlCol="0">
+            <a:spAutoFit/>
+          </a:bodyPr>
+          <a:lstStyle/>
+          <a:p>
+            <a:pPr>
+              <a:lnSpc>
+                <a:spcPct val="150000"/>
+              </a:lnSpc>
+            </a:pPr>
+            <a:r>
+              <a:rPr lang="en-US" altLang="ko-KR" dirty="0"/>
+              <a:t>UI-SJN-42-001L</a:t>
+            </a:r>
+            <a:endParaRPr lang="ko-KR" altLang="en-US" dirty="0"/>
+          </a:p>
+        </p:txBody>
+      </p:sp>
+      <p:pic>
+        <p:nvPicPr>
+          <p:cNvPr id="4" name="그림 3"/>
+          <p:cNvPicPr>
+            <a:picLocks noChangeAspect="1"/>
+          </p:cNvPicPr>
+          <p:nvPr/>
+        </p:nvPicPr>
+        <p:blipFill>
+          <a:blip r:embed="rId2"/>
+          <a:stretch>
+            <a:fillRect/>
+          </a:stretch>
+        </p:blipFill>
+        <p:spPr>
+          <a:xfrm>
+            <a:off x="683871" y="1122347"/>
+            <a:ext cx="3029373" cy="1705213"/>
+          </a:xfrm>
+          <a:prstGeom prst="rect">
+            <a:avLst/>
+          </a:prstGeom>
+        </p:spPr>
+      </p:pic>
+      <p:sp>
+        <p:nvSpPr>
+          <p:cNvPr id="10" name="TextBox 9"/>
+          <p:cNvSpPr txBox="1"/>
+          <p:nvPr/>
+        </p:nvSpPr>
+        <p:spPr>
+          <a:xfrm>
+            <a:off x="4624465" y="352269"/>
+            <a:ext cx="1821332" cy="454292"/>
+          </a:xfrm>
+          <a:prstGeom prst="rect">
+            <a:avLst/>
+          </a:prstGeom>
+          <a:noFill/>
+        </p:spPr>
+        <p:txBody>
+          <a:bodyPr wrap="none" rtlCol="0">
+            <a:spAutoFit/>
+          </a:bodyPr>
+          <a:lstStyle/>
+          <a:p>
+            <a:pPr>
+              <a:lnSpc>
+                <a:spcPct val="150000"/>
+              </a:lnSpc>
+            </a:pPr>
+            <a:r>
+              <a:rPr lang="en-US" altLang="ko-KR" dirty="0"/>
+              <a:t>UI-SJN-30-007L</a:t>
+            </a:r>
+            <a:endParaRPr lang="ko-KR" altLang="en-US" dirty="0"/>
+          </a:p>
+        </p:txBody>
+      </p:sp>
+      <p:pic>
+        <p:nvPicPr>
+          <p:cNvPr id="5" name="그림 4"/>
+          <p:cNvPicPr>
+            <a:picLocks noChangeAspect="1"/>
+          </p:cNvPicPr>
+          <p:nvPr/>
+        </p:nvPicPr>
+        <p:blipFill>
+          <a:blip r:embed="rId3"/>
+          <a:stretch>
+            <a:fillRect/>
+          </a:stretch>
+        </p:blipFill>
+        <p:spPr>
+          <a:xfrm>
+            <a:off x="4582498" y="1122347"/>
+            <a:ext cx="1905266" cy="733527"/>
+          </a:xfrm>
+          <a:prstGeom prst="rect">
+            <a:avLst/>
+          </a:prstGeom>
+        </p:spPr>
+      </p:pic>
+      <p:sp>
+        <p:nvSpPr>
+          <p:cNvPr id="12" name="TextBox 11"/>
+          <p:cNvSpPr txBox="1"/>
+          <p:nvPr/>
+        </p:nvSpPr>
+        <p:spPr>
+          <a:xfrm>
+            <a:off x="8027232" y="352269"/>
+            <a:ext cx="1821332" cy="454292"/>
+          </a:xfrm>
+          <a:prstGeom prst="rect">
+            <a:avLst/>
+          </a:prstGeom>
+          <a:noFill/>
+        </p:spPr>
+        <p:txBody>
+          <a:bodyPr wrap="none" rtlCol="0">
+            <a:spAutoFit/>
+          </a:bodyPr>
+          <a:lstStyle/>
+          <a:p>
+            <a:pPr>
+              <a:lnSpc>
+                <a:spcPct val="150000"/>
+              </a:lnSpc>
+            </a:pPr>
+            <a:r>
+              <a:rPr lang="en-US" altLang="ko-KR" dirty="0"/>
+              <a:t>UI-SJN-50-011L</a:t>
+            </a:r>
+            <a:endParaRPr lang="ko-KR" altLang="en-US" dirty="0"/>
+          </a:p>
+        </p:txBody>
+      </p:sp>
+      <p:pic>
+        <p:nvPicPr>
+          <p:cNvPr id="6" name="그림 5"/>
+          <p:cNvPicPr>
+            <a:picLocks noChangeAspect="1"/>
+          </p:cNvPicPr>
+          <p:nvPr/>
+        </p:nvPicPr>
+        <p:blipFill>
+          <a:blip r:embed="rId4"/>
+          <a:stretch>
+            <a:fillRect/>
+          </a:stretch>
+        </p:blipFill>
+        <p:spPr>
+          <a:xfrm>
+            <a:off x="8027232" y="1058317"/>
+            <a:ext cx="1762371" cy="724001"/>
+          </a:xfrm>
+          <a:prstGeom prst="rect">
+            <a:avLst/>
+          </a:prstGeom>
+        </p:spPr>
+      </p:pic>
+      <p:pic>
+        <p:nvPicPr>
+          <p:cNvPr id="7" name="그림 6"/>
+          <p:cNvPicPr>
+            <a:picLocks noChangeAspect="1"/>
+          </p:cNvPicPr>
+          <p:nvPr/>
+        </p:nvPicPr>
+        <p:blipFill>
+          <a:blip r:embed="rId5"/>
+          <a:stretch>
+            <a:fillRect/>
+          </a:stretch>
+        </p:blipFill>
+        <p:spPr>
+          <a:xfrm>
+            <a:off x="800319" y="3539331"/>
+            <a:ext cx="5210902" cy="933580"/>
+          </a:xfrm>
+          <a:prstGeom prst="rect">
+            <a:avLst/>
+          </a:prstGeom>
+        </p:spPr>
+      </p:pic>
+      <p:cxnSp>
+        <p:nvCxnSpPr>
+          <p:cNvPr id="15" name="직선 연결선 14"/>
+          <p:cNvCxnSpPr/>
+          <p:nvPr/>
+        </p:nvCxnSpPr>
+        <p:spPr>
+          <a:xfrm>
+            <a:off x="1776334" y="3919928"/>
+            <a:ext cx="749508" cy="0"/>
+          </a:xfrm>
+          <a:prstGeom prst="line">
+            <a:avLst/>
+          </a:prstGeom>
+        </p:spPr>
+        <p:style>
+          <a:lnRef idx="3">
+            <a:schemeClr val="accent2"/>
+          </a:lnRef>
+          <a:fillRef idx="0">
+            <a:schemeClr val="accent2"/>
+          </a:fillRef>
+          <a:effectRef idx="2">
+            <a:schemeClr val="accent2"/>
+          </a:effectRef>
+          <a:fontRef idx="minor">
+            <a:schemeClr val="tx1"/>
+          </a:fontRef>
+        </p:style>
+      </p:cxnSp>
+      <p:sp>
+        <p:nvSpPr>
+          <p:cNvPr id="16" name="TextBox 15"/>
+          <p:cNvSpPr txBox="1"/>
+          <p:nvPr/>
+        </p:nvSpPr>
+        <p:spPr>
+          <a:xfrm>
+            <a:off x="2763985" y="4743316"/>
+            <a:ext cx="3244799" cy="415498"/>
+          </a:xfrm>
+          <a:prstGeom prst="rect">
+            <a:avLst/>
+          </a:prstGeom>
+          <a:noFill/>
+        </p:spPr>
+        <p:txBody>
+          <a:bodyPr wrap="none" rtlCol="0">
+            <a:spAutoFit/>
+          </a:bodyPr>
+          <a:lstStyle/>
+          <a:p>
+            <a:pPr>
+              <a:lnSpc>
+                <a:spcPct val="150000"/>
+              </a:lnSpc>
+            </a:pPr>
+            <a:r>
+              <a:rPr lang="ko-KR" altLang="en-US" sz="1400" dirty="0" err="1" smtClean="0"/>
+              <a:t>동그리마</a:t>
+            </a:r>
+            <a:r>
+              <a:rPr lang="ko-KR" altLang="en-US" sz="1400" dirty="0" smtClean="0"/>
+              <a:t> 아이콘을 보여주는 </a:t>
+            </a:r>
+            <a:r>
+              <a:rPr lang="ko-KR" altLang="en-US" sz="1400" dirty="0" err="1" smtClean="0"/>
+              <a:t>클래스명</a:t>
+            </a:r>
+            <a:endParaRPr lang="en-US" altLang="ko-KR" sz="1400" dirty="0"/>
+          </a:p>
+        </p:txBody>
+      </p:sp>
+      <p:cxnSp>
+        <p:nvCxnSpPr>
+          <p:cNvPr id="18" name="직선 화살표 연결선 17"/>
+          <p:cNvCxnSpPr/>
+          <p:nvPr/>
+        </p:nvCxnSpPr>
+        <p:spPr>
+          <a:xfrm flipV="1">
+            <a:off x="2023672" y="4144780"/>
+            <a:ext cx="0" cy="933580"/>
+          </a:xfrm>
+          <a:prstGeom prst="straightConnector1">
+            <a:avLst/>
+          </a:prstGeom>
+          <a:ln>
+            <a:tailEnd type="triangle"/>
+          </a:ln>
+        </p:spPr>
+        <p:style>
+          <a:lnRef idx="1">
+            <a:schemeClr val="accent1"/>
+          </a:lnRef>
+          <a:fillRef idx="0">
+            <a:schemeClr val="accent1"/>
+          </a:fillRef>
+          <a:effectRef idx="0">
+            <a:schemeClr val="accent1"/>
+          </a:effectRef>
+          <a:fontRef idx="minor">
+            <a:schemeClr val="tx1"/>
+          </a:fontRef>
+        </p:style>
+      </p:cxnSp>
+      <p:cxnSp>
+        <p:nvCxnSpPr>
+          <p:cNvPr id="20" name="직선 화살표 연결선 19"/>
+          <p:cNvCxnSpPr/>
+          <p:nvPr/>
+        </p:nvCxnSpPr>
+        <p:spPr>
+          <a:xfrm flipV="1">
+            <a:off x="2960557" y="3889948"/>
+            <a:ext cx="0" cy="691642"/>
+          </a:xfrm>
+          <a:prstGeom prst="straightConnector1">
+            <a:avLst/>
+          </a:prstGeom>
+          <a:ln>
+            <a:tailEnd type="triangle"/>
+          </a:ln>
+        </p:spPr>
+        <p:style>
+          <a:lnRef idx="1">
+            <a:schemeClr val="accent1"/>
+          </a:lnRef>
+          <a:fillRef idx="0">
+            <a:schemeClr val="accent1"/>
+          </a:fillRef>
+          <a:effectRef idx="0">
+            <a:schemeClr val="accent1"/>
+          </a:effectRef>
+          <a:fontRef idx="minor">
+            <a:schemeClr val="tx1"/>
+          </a:fontRef>
+        </p:style>
+      </p:cxnSp>
+      <p:sp>
+        <p:nvSpPr>
+          <p:cNvPr id="21" name="TextBox 20"/>
+          <p:cNvSpPr txBox="1"/>
+          <p:nvPr/>
+        </p:nvSpPr>
+        <p:spPr>
+          <a:xfrm>
+            <a:off x="1731055" y="5337082"/>
+            <a:ext cx="3247236" cy="415498"/>
+          </a:xfrm>
+          <a:prstGeom prst="rect">
+            <a:avLst/>
+          </a:prstGeom>
+          <a:noFill/>
+        </p:spPr>
+        <p:txBody>
+          <a:bodyPr wrap="none" rtlCol="0">
+            <a:spAutoFit/>
+          </a:bodyPr>
+          <a:lstStyle/>
+          <a:p>
+            <a:pPr>
+              <a:lnSpc>
+                <a:spcPct val="150000"/>
+              </a:lnSpc>
+            </a:pPr>
+            <a:r>
+              <a:rPr lang="ko-KR" altLang="en-US" sz="1400" dirty="0" smtClean="0"/>
+              <a:t>공통적으로 </a:t>
+            </a:r>
+            <a:r>
+              <a:rPr lang="en-US" altLang="ko-KR" sz="1400" dirty="0" smtClean="0"/>
+              <a:t>bubbleBox </a:t>
+            </a:r>
+            <a:r>
+              <a:rPr lang="ko-KR" altLang="en-US" sz="1400" dirty="0" err="1" smtClean="0"/>
+              <a:t>를</a:t>
+            </a:r>
+            <a:r>
+              <a:rPr lang="ko-KR" altLang="en-US" sz="1400" dirty="0" smtClean="0"/>
+              <a:t> 사용합니다</a:t>
+            </a:r>
+            <a:r>
+              <a:rPr lang="en-US" altLang="ko-KR" sz="1400" dirty="0" smtClean="0"/>
+              <a:t>.</a:t>
+            </a:r>
+            <a:endParaRPr lang="en-US" altLang="ko-KR" sz="1400" dirty="0"/>
+          </a:p>
+        </p:txBody>
+      </p:sp>
+    </p:spTree>
+    <p:extLst>
+      <p:ext uri="{BB962C8B-B14F-4D97-AF65-F5344CB8AC3E}">
+        <p14:creationId xmlns:p14="http://schemas.microsoft.com/office/powerpoint/2010/main" val="1543209102"/>
+      </p:ext>
+    </p:extLst>
+  </p:cSld>
+  <p:clrMapOvr>
+    <a:masterClrMapping/>
+  </p:clrMapOvr>
+</p:sld>
+</file>
+
+<file path=ppt/slides/slide12.xml><?xml version="1.0" encoding="utf-8"?>
+<p:sld xmlns:a="http://schemas.openxmlformats.org/drawingml/2006/main" xmlns:r="http://schemas.openxmlformats.org/officeDocument/2006/relationships" xmlns:p="http://schemas.openxmlformats.org/presentationml/2006/main">
+  <p:cSld>
+    <p:spTree>
+      <p:nvGrpSpPr>
+        <p:cNvPr id="1" name=""/>
+        <p:cNvGrpSpPr/>
+        <p:nvPr/>
+      </p:nvGrpSpPr>
+      <p:grpSpPr>
+        <a:xfrm>
+          <a:off x="0" y="0"/>
+          <a:ext cx="0" cy="0"/>
+          <a:chOff x="0" y="0"/>
+          <a:chExt cx="0" cy="0"/>
+        </a:xfrm>
+      </p:grpSpPr>
+      <p:sp>
+        <p:nvSpPr>
+          <p:cNvPr id="14" name="TextBox 13"/>
+          <p:cNvSpPr txBox="1"/>
+          <p:nvPr/>
+        </p:nvSpPr>
+        <p:spPr>
+          <a:xfrm>
+            <a:off x="607101" y="352269"/>
+            <a:ext cx="1189749" cy="507831"/>
+          </a:xfrm>
+          <a:prstGeom prst="rect">
+            <a:avLst/>
+          </a:prstGeom>
+          <a:noFill/>
+        </p:spPr>
+        <p:txBody>
+          <a:bodyPr wrap="none" rtlCol="0">
+            <a:spAutoFit/>
+          </a:bodyPr>
+          <a:lstStyle/>
+          <a:p>
+            <a:pPr>
+              <a:lnSpc>
+                <a:spcPct val="150000"/>
+              </a:lnSpc>
+            </a:pPr>
+            <a:r>
+              <a:rPr lang="ko-KR" altLang="en-US" dirty="0" smtClean="0"/>
+              <a:t>맵 아이콘</a:t>
+            </a:r>
+            <a:endParaRPr lang="ko-KR" altLang="en-US" dirty="0"/>
+          </a:p>
+        </p:txBody>
+      </p:sp>
+      <p:pic>
+        <p:nvPicPr>
+          <p:cNvPr id="2" name="그림 1"/>
+          <p:cNvPicPr>
+            <a:picLocks noChangeAspect="1"/>
+          </p:cNvPicPr>
+          <p:nvPr/>
+        </p:nvPicPr>
+        <p:blipFill>
+          <a:blip r:embed="rId2"/>
+          <a:stretch>
+            <a:fillRect/>
+          </a:stretch>
+        </p:blipFill>
+        <p:spPr>
+          <a:xfrm>
+            <a:off x="607101" y="1034320"/>
+            <a:ext cx="4174761" cy="3777816"/>
+          </a:xfrm>
+          <a:prstGeom prst="rect">
+            <a:avLst/>
+          </a:prstGeom>
+        </p:spPr>
+      </p:pic>
+      <p:sp>
+        <p:nvSpPr>
+          <p:cNvPr id="17" name="TextBox 16"/>
+          <p:cNvSpPr txBox="1"/>
+          <p:nvPr/>
+        </p:nvSpPr>
+        <p:spPr>
+          <a:xfrm>
+            <a:off x="1003203" y="4986356"/>
+            <a:ext cx="1587294" cy="373885"/>
+          </a:xfrm>
+          <a:prstGeom prst="rect">
+            <a:avLst/>
+          </a:prstGeom>
+          <a:noFill/>
+        </p:spPr>
+        <p:txBody>
+          <a:bodyPr wrap="none" rtlCol="0">
+            <a:spAutoFit/>
+          </a:bodyPr>
+          <a:lstStyle/>
+          <a:p>
+            <a:pPr>
+              <a:lnSpc>
+                <a:spcPct val="150000"/>
+              </a:lnSpc>
+            </a:pPr>
+            <a:r>
+              <a:rPr lang="ko-KR" altLang="en-US" sz="1400" dirty="0" smtClean="0">
+                <a:solidFill>
+                  <a:srgbClr val="FF0000"/>
+                </a:solidFill>
+              </a:rPr>
+              <a:t>이게 전부인가요</a:t>
+            </a:r>
+            <a:r>
+              <a:rPr lang="en-US" altLang="ko-KR" sz="1400" dirty="0" smtClean="0">
+                <a:solidFill>
+                  <a:srgbClr val="FF0000"/>
+                </a:solidFill>
+              </a:rPr>
+              <a:t>?</a:t>
+            </a:r>
+            <a:endParaRPr lang="en-US" altLang="ko-KR" sz="1400" dirty="0">
+              <a:solidFill>
+                <a:srgbClr val="FF0000"/>
+              </a:solidFill>
+            </a:endParaRPr>
+          </a:p>
+        </p:txBody>
+      </p:sp>
+      <p:sp>
+        <p:nvSpPr>
+          <p:cNvPr id="19" name="TextBox 18"/>
+          <p:cNvSpPr txBox="1"/>
+          <p:nvPr/>
+        </p:nvSpPr>
+        <p:spPr>
+          <a:xfrm>
+            <a:off x="6115987" y="352269"/>
+            <a:ext cx="1821332" cy="454292"/>
+          </a:xfrm>
+          <a:prstGeom prst="rect">
+            <a:avLst/>
+          </a:prstGeom>
+          <a:noFill/>
+        </p:spPr>
+        <p:txBody>
+          <a:bodyPr wrap="none" rtlCol="0">
+            <a:spAutoFit/>
+          </a:bodyPr>
+          <a:lstStyle/>
+          <a:p>
+            <a:pPr>
+              <a:lnSpc>
+                <a:spcPct val="150000"/>
+              </a:lnSpc>
+            </a:pPr>
+            <a:r>
+              <a:rPr lang="en-US" altLang="ko-KR" dirty="0"/>
+              <a:t>UI-SJN-24-001L</a:t>
+            </a:r>
+            <a:endParaRPr lang="ko-KR" altLang="en-US" dirty="0"/>
+          </a:p>
+        </p:txBody>
+      </p:sp>
+      <p:pic>
+        <p:nvPicPr>
+          <p:cNvPr id="3" name="그림 2"/>
+          <p:cNvPicPr>
+            <a:picLocks noChangeAspect="1"/>
+          </p:cNvPicPr>
+          <p:nvPr/>
+        </p:nvPicPr>
+        <p:blipFill>
+          <a:blip r:embed="rId3"/>
+          <a:stretch>
+            <a:fillRect/>
+          </a:stretch>
+        </p:blipFill>
+        <p:spPr>
+          <a:xfrm>
+            <a:off x="6169365" y="1034320"/>
+            <a:ext cx="3705742" cy="1571844"/>
+          </a:xfrm>
+          <a:prstGeom prst="rect">
+            <a:avLst/>
+          </a:prstGeom>
+        </p:spPr>
+      </p:pic>
+      <p:sp>
+        <p:nvSpPr>
+          <p:cNvPr id="22" name="TextBox 21"/>
+          <p:cNvSpPr txBox="1"/>
+          <p:nvPr/>
+        </p:nvSpPr>
+        <p:spPr>
+          <a:xfrm>
+            <a:off x="6169365" y="2923228"/>
+            <a:ext cx="1829347" cy="415498"/>
+          </a:xfrm>
+          <a:prstGeom prst="rect">
+            <a:avLst/>
+          </a:prstGeom>
+          <a:noFill/>
+        </p:spPr>
+        <p:txBody>
+          <a:bodyPr wrap="none" rtlCol="0">
+            <a:spAutoFit/>
+          </a:bodyPr>
+          <a:lstStyle/>
+          <a:p>
+            <a:pPr>
+              <a:lnSpc>
+                <a:spcPct val="150000"/>
+              </a:lnSpc>
+            </a:pPr>
+            <a:r>
+              <a:rPr lang="ko-KR" altLang="en-US" sz="1400" dirty="0" smtClean="0">
+                <a:solidFill>
+                  <a:srgbClr val="FF0000"/>
+                </a:solidFill>
+              </a:rPr>
+              <a:t>이건 어떻게 하나요</a:t>
+            </a:r>
+            <a:r>
+              <a:rPr lang="en-US" altLang="ko-KR" sz="1400" dirty="0" smtClean="0">
+                <a:solidFill>
+                  <a:srgbClr val="FF0000"/>
+                </a:solidFill>
+              </a:rPr>
+              <a:t>?</a:t>
+            </a:r>
+            <a:endParaRPr lang="en-US" altLang="ko-KR" sz="1400" dirty="0">
+              <a:solidFill>
+                <a:srgbClr val="FF0000"/>
+              </a:solidFill>
+            </a:endParaRPr>
+          </a:p>
+        </p:txBody>
+      </p:sp>
+    </p:spTree>
+    <p:extLst>
+      <p:ext uri="{BB962C8B-B14F-4D97-AF65-F5344CB8AC3E}">
+        <p14:creationId xmlns:p14="http://schemas.microsoft.com/office/powerpoint/2010/main" val="259753352"/>
+      </p:ext>
+    </p:extLst>
+  </p:cSld>
+  <p:clrMapOvr>
+    <a:masterClrMapping/>
+  </p:clrMapOvr>
+</p:sld>
+</file>
+
 <file path=ppt/slides/slide2.xml><?xml version="1.0" encoding="utf-8"?>
 <p:sld xmlns:a="http://schemas.openxmlformats.org/drawingml/2006/main" xmlns:r="http://schemas.openxmlformats.org/officeDocument/2006/relationships" xmlns:p="http://schemas.openxmlformats.org/presentationml/2006/main">
   <p:cSld>

</xml_diff>